<commit_message>
added annotations to notebook 06***_jcat.ipynb
Signed-off-by: Joseph Catanzarite <jcatanza@users.noreply.github.com>
</commit_message>
<xml_diff>
--- a/study_group/meetup_slide_decks/Foundations_Lesson10d.pptx
+++ b/study_group/meetup_slide_decks/Foundations_Lesson10d.pptx
@@ -66,7 +66,7 @@
         <p:spPr>
           <a:xfrm>
             <a:off x="504000" y="210600"/>
-            <a:ext cx="7019280" cy="946800"/>
+            <a:ext cx="7018920" cy="946800"/>
           </a:xfrm>
           <a:prstGeom prst="rect">
             <a:avLst/>
@@ -97,7 +97,7 @@
         <p:spPr>
           <a:xfrm>
             <a:off x="504000" y="1326600"/>
-            <a:ext cx="4426560" cy="1568160"/>
+            <a:ext cx="2159640" cy="1568160"/>
           </a:xfrm>
           <a:prstGeom prst="rect">
             <a:avLst/>
@@ -127,7 +127,7 @@
         <p:spPr>
           <a:xfrm>
             <a:off x="504000" y="3044160"/>
-            <a:ext cx="4426560" cy="1568160"/>
+            <a:ext cx="2159640" cy="1568160"/>
           </a:xfrm>
           <a:prstGeom prst="rect">
             <a:avLst/>
@@ -179,7 +179,7 @@
         <p:spPr>
           <a:xfrm>
             <a:off x="504000" y="210600"/>
-            <a:ext cx="7019280" cy="946800"/>
+            <a:ext cx="7018920" cy="946800"/>
           </a:xfrm>
           <a:prstGeom prst="rect">
             <a:avLst/>
@@ -210,15 +210,15 @@
         <p:spPr>
           <a:xfrm>
             <a:off x="504000" y="1326600"/>
-            <a:ext cx="2160000" cy="1568160"/>
-          </a:xfrm>
-          <a:prstGeom prst="rect">
-            <a:avLst/>
-          </a:prstGeom>
-        </p:spPr>
-        <p:txBody>
-          <a:bodyPr lIns="0" rIns="0" tIns="0" bIns="0">
-            <a:normAutofit/>
+            <a:ext cx="1053720" cy="1568160"/>
+          </a:xfrm>
+          <a:prstGeom prst="rect">
+            <a:avLst/>
+          </a:prstGeom>
+        </p:spPr>
+        <p:txBody>
+          <a:bodyPr lIns="0" rIns="0" tIns="0" bIns="0">
+            <a:normAutofit fontScale="34000"/>
           </a:bodyPr>
           <a:p>
             <a:endParaRPr b="0" lang="en-US" sz="3200" spc="-1" strike="noStrike">
@@ -239,16 +239,16 @@
         </p:nvSpPr>
         <p:spPr>
           <a:xfrm>
-            <a:off x="2772360" y="1326600"/>
-            <a:ext cx="2160000" cy="1568160"/>
-          </a:xfrm>
-          <a:prstGeom prst="rect">
-            <a:avLst/>
-          </a:prstGeom>
-        </p:spPr>
-        <p:txBody>
-          <a:bodyPr lIns="0" rIns="0" tIns="0" bIns="0">
-            <a:normAutofit/>
+            <a:off x="1610640" y="1326600"/>
+            <a:ext cx="1053720" cy="1568160"/>
+          </a:xfrm>
+          <a:prstGeom prst="rect">
+            <a:avLst/>
+          </a:prstGeom>
+        </p:spPr>
+        <p:txBody>
+          <a:bodyPr lIns="0" rIns="0" tIns="0" bIns="0">
+            <a:normAutofit fontScale="34000"/>
           </a:bodyPr>
           <a:p>
             <a:endParaRPr b="0" lang="en-US" sz="3200" spc="-1" strike="noStrike">
@@ -270,15 +270,15 @@
         <p:spPr>
           <a:xfrm>
             <a:off x="504000" y="3044160"/>
-            <a:ext cx="2160000" cy="1568160"/>
-          </a:xfrm>
-          <a:prstGeom prst="rect">
-            <a:avLst/>
-          </a:prstGeom>
-        </p:spPr>
-        <p:txBody>
-          <a:bodyPr lIns="0" rIns="0" tIns="0" bIns="0">
-            <a:normAutofit/>
+            <a:ext cx="1053720" cy="1568160"/>
+          </a:xfrm>
+          <a:prstGeom prst="rect">
+            <a:avLst/>
+          </a:prstGeom>
+        </p:spPr>
+        <p:txBody>
+          <a:bodyPr lIns="0" rIns="0" tIns="0" bIns="0">
+            <a:normAutofit fontScale="34000"/>
           </a:bodyPr>
           <a:p>
             <a:endParaRPr b="0" lang="en-US" sz="3200" spc="-1" strike="noStrike">
@@ -299,16 +299,16 @@
         </p:nvSpPr>
         <p:spPr>
           <a:xfrm>
-            <a:off x="2772360" y="3044160"/>
-            <a:ext cx="2160000" cy="1568160"/>
-          </a:xfrm>
-          <a:prstGeom prst="rect">
-            <a:avLst/>
-          </a:prstGeom>
-        </p:spPr>
-        <p:txBody>
-          <a:bodyPr lIns="0" rIns="0" tIns="0" bIns="0">
-            <a:normAutofit/>
+            <a:off x="1610640" y="3044160"/>
+            <a:ext cx="1053720" cy="1568160"/>
+          </a:xfrm>
+          <a:prstGeom prst="rect">
+            <a:avLst/>
+          </a:prstGeom>
+        </p:spPr>
+        <p:txBody>
+          <a:bodyPr lIns="0" rIns="0" tIns="0" bIns="0">
+            <a:normAutofit fontScale="34000"/>
           </a:bodyPr>
           <a:p>
             <a:endParaRPr b="0" lang="en-US" sz="3200" spc="-1" strike="noStrike">
@@ -352,7 +352,7 @@
         <p:spPr>
           <a:xfrm>
             <a:off x="504000" y="210600"/>
-            <a:ext cx="7019280" cy="946800"/>
+            <a:ext cx="7018920" cy="946800"/>
           </a:xfrm>
           <a:prstGeom prst="rect">
             <a:avLst/>
@@ -383,15 +383,15 @@
         <p:spPr>
           <a:xfrm>
             <a:off x="504000" y="1326600"/>
-            <a:ext cx="1425240" cy="1568160"/>
-          </a:xfrm>
-          <a:prstGeom prst="rect">
-            <a:avLst/>
-          </a:prstGeom>
-        </p:spPr>
-        <p:txBody>
-          <a:bodyPr lIns="0" rIns="0" tIns="0" bIns="0">
-            <a:normAutofit fontScale="80000"/>
+            <a:ext cx="695160" cy="1568160"/>
+          </a:xfrm>
+          <a:prstGeom prst="rect">
+            <a:avLst/>
+          </a:prstGeom>
+        </p:spPr>
+        <p:txBody>
+          <a:bodyPr lIns="0" rIns="0" tIns="0" bIns="0">
+            <a:normAutofit fontScale="13000"/>
           </a:bodyPr>
           <a:p>
             <a:endParaRPr b="0" lang="en-US" sz="3200" spc="-1" strike="noStrike">
@@ -412,16 +412,16 @@
         </p:nvSpPr>
         <p:spPr>
           <a:xfrm>
-            <a:off x="2000880" y="1326600"/>
-            <a:ext cx="1425240" cy="1568160"/>
-          </a:xfrm>
-          <a:prstGeom prst="rect">
-            <a:avLst/>
-          </a:prstGeom>
-        </p:spPr>
-        <p:txBody>
-          <a:bodyPr lIns="0" rIns="0" tIns="0" bIns="0">
-            <a:normAutofit fontScale="80000"/>
+            <a:off x="1234440" y="1326600"/>
+            <a:ext cx="695160" cy="1568160"/>
+          </a:xfrm>
+          <a:prstGeom prst="rect">
+            <a:avLst/>
+          </a:prstGeom>
+        </p:spPr>
+        <p:txBody>
+          <a:bodyPr lIns="0" rIns="0" tIns="0" bIns="0">
+            <a:normAutofit fontScale="13000"/>
           </a:bodyPr>
           <a:p>
             <a:endParaRPr b="0" lang="en-US" sz="3200" spc="-1" strike="noStrike">
@@ -442,16 +442,16 @@
         </p:nvSpPr>
         <p:spPr>
           <a:xfrm>
-            <a:off x="3497760" y="1326600"/>
-            <a:ext cx="1425240" cy="1568160"/>
-          </a:xfrm>
-          <a:prstGeom prst="rect">
-            <a:avLst/>
-          </a:prstGeom>
-        </p:spPr>
-        <p:txBody>
-          <a:bodyPr lIns="0" rIns="0" tIns="0" bIns="0">
-            <a:normAutofit fontScale="80000"/>
+            <a:off x="1964520" y="1326600"/>
+            <a:ext cx="695160" cy="1568160"/>
+          </a:xfrm>
+          <a:prstGeom prst="rect">
+            <a:avLst/>
+          </a:prstGeom>
+        </p:spPr>
+        <p:txBody>
+          <a:bodyPr lIns="0" rIns="0" tIns="0" bIns="0">
+            <a:normAutofit fontScale="13000"/>
           </a:bodyPr>
           <a:p>
             <a:endParaRPr b="0" lang="en-US" sz="3200" spc="-1" strike="noStrike">
@@ -473,15 +473,15 @@
         <p:spPr>
           <a:xfrm>
             <a:off x="504000" y="3044160"/>
-            <a:ext cx="1425240" cy="1568160"/>
-          </a:xfrm>
-          <a:prstGeom prst="rect">
-            <a:avLst/>
-          </a:prstGeom>
-        </p:spPr>
-        <p:txBody>
-          <a:bodyPr lIns="0" rIns="0" tIns="0" bIns="0">
-            <a:normAutofit fontScale="80000"/>
+            <a:ext cx="695160" cy="1568160"/>
+          </a:xfrm>
+          <a:prstGeom prst="rect">
+            <a:avLst/>
+          </a:prstGeom>
+        </p:spPr>
+        <p:txBody>
+          <a:bodyPr lIns="0" rIns="0" tIns="0" bIns="0">
+            <a:normAutofit fontScale="13000"/>
           </a:bodyPr>
           <a:p>
             <a:endParaRPr b="0" lang="en-US" sz="3200" spc="-1" strike="noStrike">
@@ -502,16 +502,16 @@
         </p:nvSpPr>
         <p:spPr>
           <a:xfrm>
-            <a:off x="2000880" y="3044160"/>
-            <a:ext cx="1425240" cy="1568160"/>
-          </a:xfrm>
-          <a:prstGeom prst="rect">
-            <a:avLst/>
-          </a:prstGeom>
-        </p:spPr>
-        <p:txBody>
-          <a:bodyPr lIns="0" rIns="0" tIns="0" bIns="0">
-            <a:normAutofit fontScale="80000"/>
+            <a:off x="1234440" y="3044160"/>
+            <a:ext cx="695160" cy="1568160"/>
+          </a:xfrm>
+          <a:prstGeom prst="rect">
+            <a:avLst/>
+          </a:prstGeom>
+        </p:spPr>
+        <p:txBody>
+          <a:bodyPr lIns="0" rIns="0" tIns="0" bIns="0">
+            <a:normAutofit fontScale="13000"/>
           </a:bodyPr>
           <a:p>
             <a:endParaRPr b="0" lang="en-US" sz="3200" spc="-1" strike="noStrike">
@@ -532,16 +532,16 @@
         </p:nvSpPr>
         <p:spPr>
           <a:xfrm>
-            <a:off x="3497760" y="3044160"/>
-            <a:ext cx="1425240" cy="1568160"/>
-          </a:xfrm>
-          <a:prstGeom prst="rect">
-            <a:avLst/>
-          </a:prstGeom>
-        </p:spPr>
-        <p:txBody>
-          <a:bodyPr lIns="0" rIns="0" tIns="0" bIns="0">
-            <a:normAutofit fontScale="80000"/>
+            <a:off x="1964520" y="3044160"/>
+            <a:ext cx="695160" cy="1568160"/>
+          </a:xfrm>
+          <a:prstGeom prst="rect">
+            <a:avLst/>
+          </a:prstGeom>
+        </p:spPr>
+        <p:txBody>
+          <a:bodyPr lIns="0" rIns="0" tIns="0" bIns="0">
+            <a:normAutofit fontScale="13000"/>
           </a:bodyPr>
           <a:p>
             <a:endParaRPr b="0" lang="en-US" sz="3200" spc="-1" strike="noStrike">
@@ -607,7 +607,7 @@
         <p:spPr>
           <a:xfrm>
             <a:off x="504000" y="210600"/>
-            <a:ext cx="7019280" cy="946800"/>
+            <a:ext cx="7018920" cy="946800"/>
           </a:xfrm>
           <a:prstGeom prst="rect">
             <a:avLst/>
@@ -638,7 +638,7 @@
         <p:spPr>
           <a:xfrm>
             <a:off x="504000" y="1326600"/>
-            <a:ext cx="4426560" cy="3288240"/>
+            <a:ext cx="2159640" cy="3287880"/>
           </a:xfrm>
           <a:prstGeom prst="rect">
             <a:avLst/>
@@ -691,7 +691,7 @@
         <p:spPr>
           <a:xfrm>
             <a:off x="504000" y="210600"/>
-            <a:ext cx="7019280" cy="946800"/>
+            <a:ext cx="7018920" cy="946800"/>
           </a:xfrm>
           <a:prstGeom prst="rect">
             <a:avLst/>
@@ -722,7 +722,7 @@
         <p:spPr>
           <a:xfrm>
             <a:off x="504000" y="1326600"/>
-            <a:ext cx="4426560" cy="3288240"/>
+            <a:ext cx="2159640" cy="3287880"/>
           </a:xfrm>
           <a:prstGeom prst="rect">
             <a:avLst/>
@@ -774,7 +774,7 @@
         <p:spPr>
           <a:xfrm>
             <a:off x="504000" y="210600"/>
-            <a:ext cx="7019280" cy="946800"/>
+            <a:ext cx="7018920" cy="946800"/>
           </a:xfrm>
           <a:prstGeom prst="rect">
             <a:avLst/>
@@ -805,7 +805,7 @@
         <p:spPr>
           <a:xfrm>
             <a:off x="504000" y="1326600"/>
-            <a:ext cx="2160000" cy="3288240"/>
+            <a:ext cx="1053720" cy="3287880"/>
           </a:xfrm>
           <a:prstGeom prst="rect">
             <a:avLst/>
@@ -834,8 +834,8 @@
         </p:nvSpPr>
         <p:spPr>
           <a:xfrm>
-            <a:off x="2772360" y="1326600"/>
-            <a:ext cx="2160000" cy="3288240"/>
+            <a:off x="1610640" y="1326600"/>
+            <a:ext cx="1053720" cy="3287880"/>
           </a:xfrm>
           <a:prstGeom prst="rect">
             <a:avLst/>
@@ -887,7 +887,7 @@
         <p:spPr>
           <a:xfrm>
             <a:off x="504000" y="210600"/>
-            <a:ext cx="7019280" cy="946800"/>
+            <a:ext cx="7018920" cy="946800"/>
           </a:xfrm>
           <a:prstGeom prst="rect">
             <a:avLst/>
@@ -940,7 +940,7 @@
         <p:spPr>
           <a:xfrm>
             <a:off x="504000" y="210600"/>
-            <a:ext cx="7019280" cy="4390200"/>
+            <a:ext cx="7018920" cy="4390200"/>
           </a:xfrm>
           <a:prstGeom prst="rect">
             <a:avLst/>
@@ -993,7 +993,7 @@
         <p:spPr>
           <a:xfrm>
             <a:off x="504000" y="210600"/>
-            <a:ext cx="7019280" cy="946800"/>
+            <a:ext cx="7018920" cy="946800"/>
           </a:xfrm>
           <a:prstGeom prst="rect">
             <a:avLst/>
@@ -1024,7 +1024,37 @@
         <p:spPr>
           <a:xfrm>
             <a:off x="504000" y="1326600"/>
-            <a:ext cx="2160000" cy="1568160"/>
+            <a:ext cx="1053720" cy="1568160"/>
+          </a:xfrm>
+          <a:prstGeom prst="rect">
+            <a:avLst/>
+          </a:prstGeom>
+        </p:spPr>
+        <p:txBody>
+          <a:bodyPr lIns="0" rIns="0" tIns="0" bIns="0">
+            <a:normAutofit fontScale="34000"/>
+          </a:bodyPr>
+          <a:p>
+            <a:endParaRPr b="0" lang="en-US" sz="3200" spc="-1" strike="noStrike">
+              <a:latin typeface="Arial"/>
+            </a:endParaRPr>
+          </a:p>
+        </p:txBody>
+      </p:sp>
+      <p:sp>
+        <p:nvSpPr>
+          <p:cNvPr id="54" name="PlaceHolder 3"/>
+          <p:cNvSpPr>
+            <a:spLocks noGrp="1"/>
+          </p:cNvSpPr>
+          <p:nvPr>
+            <p:ph type="body"/>
+          </p:nvPr>
+        </p:nvSpPr>
+        <p:spPr>
+          <a:xfrm>
+            <a:off x="1610640" y="1326600"/>
+            <a:ext cx="1053720" cy="3287880"/>
           </a:xfrm>
           <a:prstGeom prst="rect">
             <a:avLst/>
@@ -1043,36 +1073,6 @@
       </p:sp>
       <p:sp>
         <p:nvSpPr>
-          <p:cNvPr id="54" name="PlaceHolder 3"/>
-          <p:cNvSpPr>
-            <a:spLocks noGrp="1"/>
-          </p:cNvSpPr>
-          <p:nvPr>
-            <p:ph type="body"/>
-          </p:nvPr>
-        </p:nvSpPr>
-        <p:spPr>
-          <a:xfrm>
-            <a:off x="2772360" y="1326600"/>
-            <a:ext cx="2160000" cy="3288240"/>
-          </a:xfrm>
-          <a:prstGeom prst="rect">
-            <a:avLst/>
-          </a:prstGeom>
-        </p:spPr>
-        <p:txBody>
-          <a:bodyPr lIns="0" rIns="0" tIns="0" bIns="0">
-            <a:normAutofit/>
-          </a:bodyPr>
-          <a:p>
-            <a:endParaRPr b="0" lang="en-US" sz="3200" spc="-1" strike="noStrike">
-              <a:latin typeface="Arial"/>
-            </a:endParaRPr>
-          </a:p>
-        </p:txBody>
-      </p:sp>
-      <p:sp>
-        <p:nvSpPr>
           <p:cNvPr id="55" name="PlaceHolder 4"/>
           <p:cNvSpPr>
             <a:spLocks noGrp="1"/>
@@ -1084,15 +1084,15 @@
         <p:spPr>
           <a:xfrm>
             <a:off x="504000" y="3044160"/>
-            <a:ext cx="2160000" cy="1568160"/>
-          </a:xfrm>
-          <a:prstGeom prst="rect">
-            <a:avLst/>
-          </a:prstGeom>
-        </p:spPr>
-        <p:txBody>
-          <a:bodyPr lIns="0" rIns="0" tIns="0" bIns="0">
-            <a:normAutofit/>
+            <a:ext cx="1053720" cy="1568160"/>
+          </a:xfrm>
+          <a:prstGeom prst="rect">
+            <a:avLst/>
+          </a:prstGeom>
+        </p:spPr>
+        <p:txBody>
+          <a:bodyPr lIns="0" rIns="0" tIns="0" bIns="0">
+            <a:normAutofit fontScale="34000"/>
           </a:bodyPr>
           <a:p>
             <a:endParaRPr b="0" lang="en-US" sz="3200" spc="-1" strike="noStrike">
@@ -1136,7 +1136,7 @@
         <p:spPr>
           <a:xfrm>
             <a:off x="504000" y="210600"/>
-            <a:ext cx="7019280" cy="946800"/>
+            <a:ext cx="7018920" cy="946800"/>
           </a:xfrm>
           <a:prstGeom prst="rect">
             <a:avLst/>
@@ -1167,7 +1167,7 @@
         <p:spPr>
           <a:xfrm>
             <a:off x="504000" y="1326600"/>
-            <a:ext cx="4426560" cy="3288240"/>
+            <a:ext cx="2159640" cy="3287880"/>
           </a:xfrm>
           <a:prstGeom prst="rect">
             <a:avLst/>
@@ -1220,7 +1220,7 @@
         <p:spPr>
           <a:xfrm>
             <a:off x="504000" y="210600"/>
-            <a:ext cx="7019280" cy="946800"/>
+            <a:ext cx="7018920" cy="946800"/>
           </a:xfrm>
           <a:prstGeom prst="rect">
             <a:avLst/>
@@ -1251,7 +1251,7 @@
         <p:spPr>
           <a:xfrm>
             <a:off x="504000" y="1326600"/>
-            <a:ext cx="2160000" cy="3288240"/>
+            <a:ext cx="1053720" cy="3287880"/>
           </a:xfrm>
           <a:prstGeom prst="rect">
             <a:avLst/>
@@ -1280,16 +1280,16 @@
         </p:nvSpPr>
         <p:spPr>
           <a:xfrm>
-            <a:off x="2772360" y="1326600"/>
-            <a:ext cx="2160000" cy="1568160"/>
-          </a:xfrm>
-          <a:prstGeom prst="rect">
-            <a:avLst/>
-          </a:prstGeom>
-        </p:spPr>
-        <p:txBody>
-          <a:bodyPr lIns="0" rIns="0" tIns="0" bIns="0">
-            <a:normAutofit/>
+            <a:off x="1610640" y="1326600"/>
+            <a:ext cx="1053720" cy="1568160"/>
+          </a:xfrm>
+          <a:prstGeom prst="rect">
+            <a:avLst/>
+          </a:prstGeom>
+        </p:spPr>
+        <p:txBody>
+          <a:bodyPr lIns="0" rIns="0" tIns="0" bIns="0">
+            <a:normAutofit fontScale="34000"/>
           </a:bodyPr>
           <a:p>
             <a:endParaRPr b="0" lang="en-US" sz="3200" spc="-1" strike="noStrike">
@@ -1310,16 +1310,16 @@
         </p:nvSpPr>
         <p:spPr>
           <a:xfrm>
-            <a:off x="2772360" y="3044160"/>
-            <a:ext cx="2160000" cy="1568160"/>
-          </a:xfrm>
-          <a:prstGeom prst="rect">
-            <a:avLst/>
-          </a:prstGeom>
-        </p:spPr>
-        <p:txBody>
-          <a:bodyPr lIns="0" rIns="0" tIns="0" bIns="0">
-            <a:normAutofit/>
+            <a:off x="1610640" y="3044160"/>
+            <a:ext cx="1053720" cy="1568160"/>
+          </a:xfrm>
+          <a:prstGeom prst="rect">
+            <a:avLst/>
+          </a:prstGeom>
+        </p:spPr>
+        <p:txBody>
+          <a:bodyPr lIns="0" rIns="0" tIns="0" bIns="0">
+            <a:normAutofit fontScale="34000"/>
           </a:bodyPr>
           <a:p>
             <a:endParaRPr b="0" lang="en-US" sz="3200" spc="-1" strike="noStrike">
@@ -1363,7 +1363,7 @@
         <p:spPr>
           <a:xfrm>
             <a:off x="504000" y="210600"/>
-            <a:ext cx="7019280" cy="946800"/>
+            <a:ext cx="7018920" cy="946800"/>
           </a:xfrm>
           <a:prstGeom prst="rect">
             <a:avLst/>
@@ -1394,15 +1394,15 @@
         <p:spPr>
           <a:xfrm>
             <a:off x="504000" y="1326600"/>
-            <a:ext cx="2160000" cy="1568160"/>
-          </a:xfrm>
-          <a:prstGeom prst="rect">
-            <a:avLst/>
-          </a:prstGeom>
-        </p:spPr>
-        <p:txBody>
-          <a:bodyPr lIns="0" rIns="0" tIns="0" bIns="0">
-            <a:normAutofit/>
+            <a:ext cx="1053720" cy="1568160"/>
+          </a:xfrm>
+          <a:prstGeom prst="rect">
+            <a:avLst/>
+          </a:prstGeom>
+        </p:spPr>
+        <p:txBody>
+          <a:bodyPr lIns="0" rIns="0" tIns="0" bIns="0">
+            <a:normAutofit fontScale="34000"/>
           </a:bodyPr>
           <a:p>
             <a:endParaRPr b="0" lang="en-US" sz="3200" spc="-1" strike="noStrike">
@@ -1423,16 +1423,16 @@
         </p:nvSpPr>
         <p:spPr>
           <a:xfrm>
-            <a:off x="2772360" y="1326600"/>
-            <a:ext cx="2160000" cy="1568160"/>
-          </a:xfrm>
-          <a:prstGeom prst="rect">
-            <a:avLst/>
-          </a:prstGeom>
-        </p:spPr>
-        <p:txBody>
-          <a:bodyPr lIns="0" rIns="0" tIns="0" bIns="0">
-            <a:normAutofit/>
+            <a:off x="1610640" y="1326600"/>
+            <a:ext cx="1053720" cy="1568160"/>
+          </a:xfrm>
+          <a:prstGeom prst="rect">
+            <a:avLst/>
+          </a:prstGeom>
+        </p:spPr>
+        <p:txBody>
+          <a:bodyPr lIns="0" rIns="0" tIns="0" bIns="0">
+            <a:normAutofit fontScale="34000"/>
           </a:bodyPr>
           <a:p>
             <a:endParaRPr b="0" lang="en-US" sz="3200" spc="-1" strike="noStrike">
@@ -1454,7 +1454,7 @@
         <p:spPr>
           <a:xfrm>
             <a:off x="504000" y="3044160"/>
-            <a:ext cx="4426560" cy="1568160"/>
+            <a:ext cx="2159640" cy="1568160"/>
           </a:xfrm>
           <a:prstGeom prst="rect">
             <a:avLst/>
@@ -1506,7 +1506,7 @@
         <p:spPr>
           <a:xfrm>
             <a:off x="504000" y="210600"/>
-            <a:ext cx="7019280" cy="946800"/>
+            <a:ext cx="7018920" cy="946800"/>
           </a:xfrm>
           <a:prstGeom prst="rect">
             <a:avLst/>
@@ -1537,7 +1537,7 @@
         <p:spPr>
           <a:xfrm>
             <a:off x="504000" y="1326600"/>
-            <a:ext cx="4426560" cy="1568160"/>
+            <a:ext cx="2159640" cy="1568160"/>
           </a:xfrm>
           <a:prstGeom prst="rect">
             <a:avLst/>
@@ -1567,7 +1567,7 @@
         <p:spPr>
           <a:xfrm>
             <a:off x="504000" y="3044160"/>
-            <a:ext cx="4426560" cy="1568160"/>
+            <a:ext cx="2159640" cy="1568160"/>
           </a:xfrm>
           <a:prstGeom prst="rect">
             <a:avLst/>
@@ -1619,7 +1619,7 @@
         <p:spPr>
           <a:xfrm>
             <a:off x="504000" y="210600"/>
-            <a:ext cx="7019280" cy="946800"/>
+            <a:ext cx="7018920" cy="946800"/>
           </a:xfrm>
           <a:prstGeom prst="rect">
             <a:avLst/>
@@ -1650,15 +1650,15 @@
         <p:spPr>
           <a:xfrm>
             <a:off x="504000" y="1326600"/>
-            <a:ext cx="2160000" cy="1568160"/>
-          </a:xfrm>
-          <a:prstGeom prst="rect">
-            <a:avLst/>
-          </a:prstGeom>
-        </p:spPr>
-        <p:txBody>
-          <a:bodyPr lIns="0" rIns="0" tIns="0" bIns="0">
-            <a:normAutofit/>
+            <a:ext cx="1053720" cy="1568160"/>
+          </a:xfrm>
+          <a:prstGeom prst="rect">
+            <a:avLst/>
+          </a:prstGeom>
+        </p:spPr>
+        <p:txBody>
+          <a:bodyPr lIns="0" rIns="0" tIns="0" bIns="0">
+            <a:normAutofit fontScale="34000"/>
           </a:bodyPr>
           <a:p>
             <a:endParaRPr b="0" lang="en-US" sz="3200" spc="-1" strike="noStrike">
@@ -1679,16 +1679,16 @@
         </p:nvSpPr>
         <p:spPr>
           <a:xfrm>
-            <a:off x="2772360" y="1326600"/>
-            <a:ext cx="2160000" cy="1568160"/>
-          </a:xfrm>
-          <a:prstGeom prst="rect">
-            <a:avLst/>
-          </a:prstGeom>
-        </p:spPr>
-        <p:txBody>
-          <a:bodyPr lIns="0" rIns="0" tIns="0" bIns="0">
-            <a:normAutofit/>
+            <a:off x="1610640" y="1326600"/>
+            <a:ext cx="1053720" cy="1568160"/>
+          </a:xfrm>
+          <a:prstGeom prst="rect">
+            <a:avLst/>
+          </a:prstGeom>
+        </p:spPr>
+        <p:txBody>
+          <a:bodyPr lIns="0" rIns="0" tIns="0" bIns="0">
+            <a:normAutofit fontScale="34000"/>
           </a:bodyPr>
           <a:p>
             <a:endParaRPr b="0" lang="en-US" sz="3200" spc="-1" strike="noStrike">
@@ -1710,15 +1710,15 @@
         <p:spPr>
           <a:xfrm>
             <a:off x="504000" y="3044160"/>
-            <a:ext cx="2160000" cy="1568160"/>
-          </a:xfrm>
-          <a:prstGeom prst="rect">
-            <a:avLst/>
-          </a:prstGeom>
-        </p:spPr>
-        <p:txBody>
-          <a:bodyPr lIns="0" rIns="0" tIns="0" bIns="0">
-            <a:normAutofit/>
+            <a:ext cx="1053720" cy="1568160"/>
+          </a:xfrm>
+          <a:prstGeom prst="rect">
+            <a:avLst/>
+          </a:prstGeom>
+        </p:spPr>
+        <p:txBody>
+          <a:bodyPr lIns="0" rIns="0" tIns="0" bIns="0">
+            <a:normAutofit fontScale="34000"/>
           </a:bodyPr>
           <a:p>
             <a:endParaRPr b="0" lang="en-US" sz="3200" spc="-1" strike="noStrike">
@@ -1739,16 +1739,16 @@
         </p:nvSpPr>
         <p:spPr>
           <a:xfrm>
-            <a:off x="2772360" y="3044160"/>
-            <a:ext cx="2160000" cy="1568160"/>
-          </a:xfrm>
-          <a:prstGeom prst="rect">
-            <a:avLst/>
-          </a:prstGeom>
-        </p:spPr>
-        <p:txBody>
-          <a:bodyPr lIns="0" rIns="0" tIns="0" bIns="0">
-            <a:normAutofit/>
+            <a:off x="1610640" y="3044160"/>
+            <a:ext cx="1053720" cy="1568160"/>
+          </a:xfrm>
+          <a:prstGeom prst="rect">
+            <a:avLst/>
+          </a:prstGeom>
+        </p:spPr>
+        <p:txBody>
+          <a:bodyPr lIns="0" rIns="0" tIns="0" bIns="0">
+            <a:normAutofit fontScale="34000"/>
           </a:bodyPr>
           <a:p>
             <a:endParaRPr b="0" lang="en-US" sz="3200" spc="-1" strike="noStrike">
@@ -1792,7 +1792,7 @@
         <p:spPr>
           <a:xfrm>
             <a:off x="504000" y="210600"/>
-            <a:ext cx="7019280" cy="946800"/>
+            <a:ext cx="7018920" cy="946800"/>
           </a:xfrm>
           <a:prstGeom prst="rect">
             <a:avLst/>
@@ -1823,15 +1823,15 @@
         <p:spPr>
           <a:xfrm>
             <a:off x="504000" y="1326600"/>
-            <a:ext cx="1425240" cy="1568160"/>
-          </a:xfrm>
-          <a:prstGeom prst="rect">
-            <a:avLst/>
-          </a:prstGeom>
-        </p:spPr>
-        <p:txBody>
-          <a:bodyPr lIns="0" rIns="0" tIns="0" bIns="0">
-            <a:normAutofit fontScale="80000"/>
+            <a:ext cx="695160" cy="1568160"/>
+          </a:xfrm>
+          <a:prstGeom prst="rect">
+            <a:avLst/>
+          </a:prstGeom>
+        </p:spPr>
+        <p:txBody>
+          <a:bodyPr lIns="0" rIns="0" tIns="0" bIns="0">
+            <a:normAutofit fontScale="13000"/>
           </a:bodyPr>
           <a:p>
             <a:endParaRPr b="0" lang="en-US" sz="3200" spc="-1" strike="noStrike">
@@ -1852,16 +1852,16 @@
         </p:nvSpPr>
         <p:spPr>
           <a:xfrm>
-            <a:off x="2000880" y="1326600"/>
-            <a:ext cx="1425240" cy="1568160"/>
-          </a:xfrm>
-          <a:prstGeom prst="rect">
-            <a:avLst/>
-          </a:prstGeom>
-        </p:spPr>
-        <p:txBody>
-          <a:bodyPr lIns="0" rIns="0" tIns="0" bIns="0">
-            <a:normAutofit fontScale="80000"/>
+            <a:off x="1234440" y="1326600"/>
+            <a:ext cx="695160" cy="1568160"/>
+          </a:xfrm>
+          <a:prstGeom prst="rect">
+            <a:avLst/>
+          </a:prstGeom>
+        </p:spPr>
+        <p:txBody>
+          <a:bodyPr lIns="0" rIns="0" tIns="0" bIns="0">
+            <a:normAutofit fontScale="13000"/>
           </a:bodyPr>
           <a:p>
             <a:endParaRPr b="0" lang="en-US" sz="3200" spc="-1" strike="noStrike">
@@ -1882,16 +1882,16 @@
         </p:nvSpPr>
         <p:spPr>
           <a:xfrm>
-            <a:off x="3497760" y="1326600"/>
-            <a:ext cx="1425240" cy="1568160"/>
-          </a:xfrm>
-          <a:prstGeom prst="rect">
-            <a:avLst/>
-          </a:prstGeom>
-        </p:spPr>
-        <p:txBody>
-          <a:bodyPr lIns="0" rIns="0" tIns="0" bIns="0">
-            <a:normAutofit fontScale="80000"/>
+            <a:off x="1964520" y="1326600"/>
+            <a:ext cx="695160" cy="1568160"/>
+          </a:xfrm>
+          <a:prstGeom prst="rect">
+            <a:avLst/>
+          </a:prstGeom>
+        </p:spPr>
+        <p:txBody>
+          <a:bodyPr lIns="0" rIns="0" tIns="0" bIns="0">
+            <a:normAutofit fontScale="13000"/>
           </a:bodyPr>
           <a:p>
             <a:endParaRPr b="0" lang="en-US" sz="3200" spc="-1" strike="noStrike">
@@ -1913,15 +1913,15 @@
         <p:spPr>
           <a:xfrm>
             <a:off x="504000" y="3044160"/>
-            <a:ext cx="1425240" cy="1568160"/>
-          </a:xfrm>
-          <a:prstGeom prst="rect">
-            <a:avLst/>
-          </a:prstGeom>
-        </p:spPr>
-        <p:txBody>
-          <a:bodyPr lIns="0" rIns="0" tIns="0" bIns="0">
-            <a:normAutofit fontScale="80000"/>
+            <a:ext cx="695160" cy="1568160"/>
+          </a:xfrm>
+          <a:prstGeom prst="rect">
+            <a:avLst/>
+          </a:prstGeom>
+        </p:spPr>
+        <p:txBody>
+          <a:bodyPr lIns="0" rIns="0" tIns="0" bIns="0">
+            <a:normAutofit fontScale="13000"/>
           </a:bodyPr>
           <a:p>
             <a:endParaRPr b="0" lang="en-US" sz="3200" spc="-1" strike="noStrike">
@@ -1942,16 +1942,16 @@
         </p:nvSpPr>
         <p:spPr>
           <a:xfrm>
-            <a:off x="2000880" y="3044160"/>
-            <a:ext cx="1425240" cy="1568160"/>
-          </a:xfrm>
-          <a:prstGeom prst="rect">
-            <a:avLst/>
-          </a:prstGeom>
-        </p:spPr>
-        <p:txBody>
-          <a:bodyPr lIns="0" rIns="0" tIns="0" bIns="0">
-            <a:normAutofit fontScale="80000"/>
+            <a:off x="1234440" y="3044160"/>
+            <a:ext cx="695160" cy="1568160"/>
+          </a:xfrm>
+          <a:prstGeom prst="rect">
+            <a:avLst/>
+          </a:prstGeom>
+        </p:spPr>
+        <p:txBody>
+          <a:bodyPr lIns="0" rIns="0" tIns="0" bIns="0">
+            <a:normAutofit fontScale="13000"/>
           </a:bodyPr>
           <a:p>
             <a:endParaRPr b="0" lang="en-US" sz="3200" spc="-1" strike="noStrike">
@@ -1972,16 +1972,16 @@
         </p:nvSpPr>
         <p:spPr>
           <a:xfrm>
-            <a:off x="3497760" y="3044160"/>
-            <a:ext cx="1425240" cy="1568160"/>
-          </a:xfrm>
-          <a:prstGeom prst="rect">
-            <a:avLst/>
-          </a:prstGeom>
-        </p:spPr>
-        <p:txBody>
-          <a:bodyPr lIns="0" rIns="0" tIns="0" bIns="0">
-            <a:normAutofit fontScale="80000"/>
+            <a:off x="1964520" y="3044160"/>
+            <a:ext cx="695160" cy="1568160"/>
+          </a:xfrm>
+          <a:prstGeom prst="rect">
+            <a:avLst/>
+          </a:prstGeom>
+        </p:spPr>
+        <p:txBody>
+          <a:bodyPr lIns="0" rIns="0" tIns="0" bIns="0">
+            <a:normAutofit fontScale="13000"/>
           </a:bodyPr>
           <a:p>
             <a:endParaRPr b="0" lang="en-US" sz="3200" spc="-1" strike="noStrike">
@@ -2025,7 +2025,7 @@
         <p:spPr>
           <a:xfrm>
             <a:off x="504000" y="210600"/>
-            <a:ext cx="7019280" cy="946800"/>
+            <a:ext cx="7018920" cy="946800"/>
           </a:xfrm>
           <a:prstGeom prst="rect">
             <a:avLst/>
@@ -2056,7 +2056,7 @@
         <p:spPr>
           <a:xfrm>
             <a:off x="504000" y="1326600"/>
-            <a:ext cx="4426560" cy="3288240"/>
+            <a:ext cx="2159640" cy="3287880"/>
           </a:xfrm>
           <a:prstGeom prst="rect">
             <a:avLst/>
@@ -2108,7 +2108,7 @@
         <p:spPr>
           <a:xfrm>
             <a:off x="504000" y="210600"/>
-            <a:ext cx="7019280" cy="946800"/>
+            <a:ext cx="7018920" cy="946800"/>
           </a:xfrm>
           <a:prstGeom prst="rect">
             <a:avLst/>
@@ -2139,7 +2139,7 @@
         <p:spPr>
           <a:xfrm>
             <a:off x="504000" y="1326600"/>
-            <a:ext cx="2160000" cy="3288240"/>
+            <a:ext cx="1053720" cy="3287880"/>
           </a:xfrm>
           <a:prstGeom prst="rect">
             <a:avLst/>
@@ -2168,8 +2168,8 @@
         </p:nvSpPr>
         <p:spPr>
           <a:xfrm>
-            <a:off x="2772360" y="1326600"/>
-            <a:ext cx="2160000" cy="3288240"/>
+            <a:off x="1610640" y="1326600"/>
+            <a:ext cx="1053720" cy="3287880"/>
           </a:xfrm>
           <a:prstGeom prst="rect">
             <a:avLst/>
@@ -2221,7 +2221,7 @@
         <p:spPr>
           <a:xfrm>
             <a:off x="504000" y="210600"/>
-            <a:ext cx="7019280" cy="946800"/>
+            <a:ext cx="7018920" cy="946800"/>
           </a:xfrm>
           <a:prstGeom prst="rect">
             <a:avLst/>
@@ -2274,7 +2274,7 @@
         <p:spPr>
           <a:xfrm>
             <a:off x="504000" y="210600"/>
-            <a:ext cx="7019280" cy="4390200"/>
+            <a:ext cx="7018920" cy="4390200"/>
           </a:xfrm>
           <a:prstGeom prst="rect">
             <a:avLst/>
@@ -2327,7 +2327,7 @@
         <p:spPr>
           <a:xfrm>
             <a:off x="504000" y="210600"/>
-            <a:ext cx="7019280" cy="946800"/>
+            <a:ext cx="7018920" cy="946800"/>
           </a:xfrm>
           <a:prstGeom prst="rect">
             <a:avLst/>
@@ -2358,7 +2358,37 @@
         <p:spPr>
           <a:xfrm>
             <a:off x="504000" y="1326600"/>
-            <a:ext cx="2160000" cy="1568160"/>
+            <a:ext cx="1053720" cy="1568160"/>
+          </a:xfrm>
+          <a:prstGeom prst="rect">
+            <a:avLst/>
+          </a:prstGeom>
+        </p:spPr>
+        <p:txBody>
+          <a:bodyPr lIns="0" rIns="0" tIns="0" bIns="0">
+            <a:normAutofit fontScale="34000"/>
+          </a:bodyPr>
+          <a:p>
+            <a:endParaRPr b="0" lang="en-US" sz="3200" spc="-1" strike="noStrike">
+              <a:latin typeface="Arial"/>
+            </a:endParaRPr>
+          </a:p>
+        </p:txBody>
+      </p:sp>
+      <p:sp>
+        <p:nvSpPr>
+          <p:cNvPr id="14" name="PlaceHolder 3"/>
+          <p:cNvSpPr>
+            <a:spLocks noGrp="1"/>
+          </p:cNvSpPr>
+          <p:nvPr>
+            <p:ph type="body"/>
+          </p:nvPr>
+        </p:nvSpPr>
+        <p:spPr>
+          <a:xfrm>
+            <a:off x="1610640" y="1326600"/>
+            <a:ext cx="1053720" cy="3287880"/>
           </a:xfrm>
           <a:prstGeom prst="rect">
             <a:avLst/>
@@ -2377,36 +2407,6 @@
       </p:sp>
       <p:sp>
         <p:nvSpPr>
-          <p:cNvPr id="14" name="PlaceHolder 3"/>
-          <p:cNvSpPr>
-            <a:spLocks noGrp="1"/>
-          </p:cNvSpPr>
-          <p:nvPr>
-            <p:ph type="body"/>
-          </p:nvPr>
-        </p:nvSpPr>
-        <p:spPr>
-          <a:xfrm>
-            <a:off x="2772360" y="1326600"/>
-            <a:ext cx="2160000" cy="3288240"/>
-          </a:xfrm>
-          <a:prstGeom prst="rect">
-            <a:avLst/>
-          </a:prstGeom>
-        </p:spPr>
-        <p:txBody>
-          <a:bodyPr lIns="0" rIns="0" tIns="0" bIns="0">
-            <a:normAutofit/>
-          </a:bodyPr>
-          <a:p>
-            <a:endParaRPr b="0" lang="en-US" sz="3200" spc="-1" strike="noStrike">
-              <a:latin typeface="Arial"/>
-            </a:endParaRPr>
-          </a:p>
-        </p:txBody>
-      </p:sp>
-      <p:sp>
-        <p:nvSpPr>
           <p:cNvPr id="15" name="PlaceHolder 4"/>
           <p:cNvSpPr>
             <a:spLocks noGrp="1"/>
@@ -2418,15 +2418,15 @@
         <p:spPr>
           <a:xfrm>
             <a:off x="504000" y="3044160"/>
-            <a:ext cx="2160000" cy="1568160"/>
-          </a:xfrm>
-          <a:prstGeom prst="rect">
-            <a:avLst/>
-          </a:prstGeom>
-        </p:spPr>
-        <p:txBody>
-          <a:bodyPr lIns="0" rIns="0" tIns="0" bIns="0">
-            <a:normAutofit/>
+            <a:ext cx="1053720" cy="1568160"/>
+          </a:xfrm>
+          <a:prstGeom prst="rect">
+            <a:avLst/>
+          </a:prstGeom>
+        </p:spPr>
+        <p:txBody>
+          <a:bodyPr lIns="0" rIns="0" tIns="0" bIns="0">
+            <a:normAutofit fontScale="34000"/>
           </a:bodyPr>
           <a:p>
             <a:endParaRPr b="0" lang="en-US" sz="3200" spc="-1" strike="noStrike">
@@ -2470,7 +2470,7 @@
         <p:spPr>
           <a:xfrm>
             <a:off x="504000" y="210600"/>
-            <a:ext cx="7019280" cy="946800"/>
+            <a:ext cx="7018920" cy="946800"/>
           </a:xfrm>
           <a:prstGeom prst="rect">
             <a:avLst/>
@@ -2501,7 +2501,7 @@
         <p:spPr>
           <a:xfrm>
             <a:off x="504000" y="1326600"/>
-            <a:ext cx="2160000" cy="3288240"/>
+            <a:ext cx="1053720" cy="3287880"/>
           </a:xfrm>
           <a:prstGeom prst="rect">
             <a:avLst/>
@@ -2530,16 +2530,16 @@
         </p:nvSpPr>
         <p:spPr>
           <a:xfrm>
-            <a:off x="2772360" y="1326600"/>
-            <a:ext cx="2160000" cy="1568160"/>
-          </a:xfrm>
-          <a:prstGeom prst="rect">
-            <a:avLst/>
-          </a:prstGeom>
-        </p:spPr>
-        <p:txBody>
-          <a:bodyPr lIns="0" rIns="0" tIns="0" bIns="0">
-            <a:normAutofit/>
+            <a:off x="1610640" y="1326600"/>
+            <a:ext cx="1053720" cy="1568160"/>
+          </a:xfrm>
+          <a:prstGeom prst="rect">
+            <a:avLst/>
+          </a:prstGeom>
+        </p:spPr>
+        <p:txBody>
+          <a:bodyPr lIns="0" rIns="0" tIns="0" bIns="0">
+            <a:normAutofit fontScale="34000"/>
           </a:bodyPr>
           <a:p>
             <a:endParaRPr b="0" lang="en-US" sz="3200" spc="-1" strike="noStrike">
@@ -2560,16 +2560,16 @@
         </p:nvSpPr>
         <p:spPr>
           <a:xfrm>
-            <a:off x="2772360" y="3044160"/>
-            <a:ext cx="2160000" cy="1568160"/>
-          </a:xfrm>
-          <a:prstGeom prst="rect">
-            <a:avLst/>
-          </a:prstGeom>
-        </p:spPr>
-        <p:txBody>
-          <a:bodyPr lIns="0" rIns="0" tIns="0" bIns="0">
-            <a:normAutofit/>
+            <a:off x="1610640" y="3044160"/>
+            <a:ext cx="1053720" cy="1568160"/>
+          </a:xfrm>
+          <a:prstGeom prst="rect">
+            <a:avLst/>
+          </a:prstGeom>
+        </p:spPr>
+        <p:txBody>
+          <a:bodyPr lIns="0" rIns="0" tIns="0" bIns="0">
+            <a:normAutofit fontScale="34000"/>
           </a:bodyPr>
           <a:p>
             <a:endParaRPr b="0" lang="en-US" sz="3200" spc="-1" strike="noStrike">
@@ -2613,7 +2613,7 @@
         <p:spPr>
           <a:xfrm>
             <a:off x="504000" y="210600"/>
-            <a:ext cx="7019280" cy="946800"/>
+            <a:ext cx="7018920" cy="946800"/>
           </a:xfrm>
           <a:prstGeom prst="rect">
             <a:avLst/>
@@ -2644,15 +2644,15 @@
         <p:spPr>
           <a:xfrm>
             <a:off x="504000" y="1326600"/>
-            <a:ext cx="2160000" cy="1568160"/>
-          </a:xfrm>
-          <a:prstGeom prst="rect">
-            <a:avLst/>
-          </a:prstGeom>
-        </p:spPr>
-        <p:txBody>
-          <a:bodyPr lIns="0" rIns="0" tIns="0" bIns="0">
-            <a:normAutofit/>
+            <a:ext cx="1053720" cy="1568160"/>
+          </a:xfrm>
+          <a:prstGeom prst="rect">
+            <a:avLst/>
+          </a:prstGeom>
+        </p:spPr>
+        <p:txBody>
+          <a:bodyPr lIns="0" rIns="0" tIns="0" bIns="0">
+            <a:normAutofit fontScale="34000"/>
           </a:bodyPr>
           <a:p>
             <a:endParaRPr b="0" lang="en-US" sz="3200" spc="-1" strike="noStrike">
@@ -2673,16 +2673,16 @@
         </p:nvSpPr>
         <p:spPr>
           <a:xfrm>
-            <a:off x="2772360" y="1326600"/>
-            <a:ext cx="2160000" cy="1568160"/>
-          </a:xfrm>
-          <a:prstGeom prst="rect">
-            <a:avLst/>
-          </a:prstGeom>
-        </p:spPr>
-        <p:txBody>
-          <a:bodyPr lIns="0" rIns="0" tIns="0" bIns="0">
-            <a:normAutofit/>
+            <a:off x="1610640" y="1326600"/>
+            <a:ext cx="1053720" cy="1568160"/>
+          </a:xfrm>
+          <a:prstGeom prst="rect">
+            <a:avLst/>
+          </a:prstGeom>
+        </p:spPr>
+        <p:txBody>
+          <a:bodyPr lIns="0" rIns="0" tIns="0" bIns="0">
+            <a:normAutofit fontScale="34000"/>
           </a:bodyPr>
           <a:p>
             <a:endParaRPr b="0" lang="en-US" sz="3200" spc="-1" strike="noStrike">
@@ -2704,7 +2704,7 @@
         <p:spPr>
           <a:xfrm>
             <a:off x="504000" y="3044160"/>
-            <a:ext cx="4426560" cy="1568160"/>
+            <a:ext cx="2159640" cy="1568160"/>
           </a:xfrm>
           <a:prstGeom prst="rect">
             <a:avLst/>
@@ -2756,7 +2756,7 @@
         <p:spPr>
           <a:xfrm>
             <a:off x="-58320" y="81000"/>
-            <a:ext cx="7793640" cy="1204920"/>
+            <a:ext cx="7793280" cy="1204560"/>
           </a:xfrm>
           <a:prstGeom prst="rect">
             <a:avLst/>
@@ -2778,8 +2778,8 @@
         </p:nvSpPr>
         <p:spPr>
           <a:xfrm>
-            <a:off x="504000" y="210600"/>
-            <a:ext cx="7019280" cy="946800"/>
+            <a:off x="504000" y="226080"/>
+            <a:ext cx="9072000" cy="946440"/>
           </a:xfrm>
           <a:prstGeom prst="rect">
             <a:avLst/>
@@ -2787,16 +2787,17 @@
         </p:spPr>
         <p:txBody>
           <a:bodyPr lIns="0" rIns="0" tIns="0" bIns="0" anchor="ctr">
-            <a:spAutoFit/>
-          </a:bodyPr>
-          <a:p>
+            <a:noAutofit/>
+          </a:bodyPr>
+          <a:p>
+            <a:pPr algn="ctr"/>
             <a:r>
-              <a:rPr b="0" lang="en-US" sz="1800" spc="-1" strike="noStrike">
+              <a:rPr b="0" lang="en-US" sz="4400" spc="-1" strike="noStrike">
                 <a:latin typeface="Arial"/>
               </a:rPr>
               <a:t>Click to edit the title text format</a:t>
             </a:r>
-            <a:endParaRPr b="0" lang="en-US" sz="1800" spc="-1" strike="noStrike">
+            <a:endParaRPr b="0" lang="en-US" sz="4400" spc="-1" strike="noStrike">
               <a:latin typeface="Arial"/>
             </a:endParaRPr>
           </a:p>
@@ -2815,7 +2816,7 @@
         <p:spPr>
           <a:xfrm>
             <a:off x="504000" y="1326600"/>
-            <a:ext cx="9071640" cy="3288240"/>
+            <a:ext cx="9072000" cy="3288600"/>
           </a:xfrm>
           <a:prstGeom prst="rect">
             <a:avLst/>
@@ -2838,12 +2839,12 @@
               <a:buChar char=""/>
             </a:pPr>
             <a:r>
-              <a:rPr b="0" lang="en-US" sz="1800" spc="-1" strike="noStrike">
+              <a:rPr b="0" lang="en-US" sz="3200" spc="-1" strike="noStrike">
                 <a:latin typeface="Arial"/>
               </a:rPr>
               <a:t>Click to edit the outline text format</a:t>
             </a:r>
-            <a:endParaRPr b="0" lang="en-US" sz="1800" spc="-1" strike="noStrike">
+            <a:endParaRPr b="0" lang="en-US" sz="3200" spc="-1" strike="noStrike">
               <a:latin typeface="Arial"/>
             </a:endParaRPr>
           </a:p>
@@ -2860,12 +2861,12 @@
               <a:buChar char=""/>
             </a:pPr>
             <a:r>
-              <a:rPr b="0" lang="en-US" sz="1800" spc="-1" strike="noStrike">
+              <a:rPr b="0" lang="en-US" sz="2800" spc="-1" strike="noStrike">
                 <a:latin typeface="Arial"/>
               </a:rPr>
               <a:t>Second Outline Level</a:t>
             </a:r>
-            <a:endParaRPr b="0" lang="en-US" sz="1800" spc="-1" strike="noStrike">
+            <a:endParaRPr b="0" lang="en-US" sz="2800" spc="-1" strike="noStrike">
               <a:latin typeface="Arial"/>
             </a:endParaRPr>
           </a:p>
@@ -2882,12 +2883,12 @@
               <a:buChar char=""/>
             </a:pPr>
             <a:r>
-              <a:rPr b="0" lang="en-US" sz="1800" spc="-1" strike="noStrike">
+              <a:rPr b="0" lang="en-US" sz="2400" spc="-1" strike="noStrike">
                 <a:latin typeface="Arial"/>
               </a:rPr>
               <a:t>Third Outline Level</a:t>
             </a:r>
-            <a:endParaRPr b="0" lang="en-US" sz="1800" spc="-1" strike="noStrike">
+            <a:endParaRPr b="0" lang="en-US" sz="2400" spc="-1" strike="noStrike">
               <a:latin typeface="Arial"/>
             </a:endParaRPr>
           </a:p>
@@ -2904,12 +2905,12 @@
               <a:buChar char=""/>
             </a:pPr>
             <a:r>
-              <a:rPr b="0" lang="en-US" sz="1800" spc="-1" strike="noStrike">
+              <a:rPr b="0" lang="en-US" sz="2000" spc="-1" strike="noStrike">
                 <a:latin typeface="Arial"/>
               </a:rPr>
               <a:t>Fourth Outline Level</a:t>
             </a:r>
-            <a:endParaRPr b="0" lang="en-US" sz="1800" spc="-1" strike="noStrike">
+            <a:endParaRPr b="0" lang="en-US" sz="2000" spc="-1" strike="noStrike">
               <a:latin typeface="Arial"/>
             </a:endParaRPr>
           </a:p>
@@ -2926,12 +2927,12 @@
               <a:buChar char=""/>
             </a:pPr>
             <a:r>
-              <a:rPr b="0" lang="en-US" sz="1800" spc="-1" strike="noStrike">
+              <a:rPr b="0" lang="en-US" sz="2000" spc="-1" strike="noStrike">
                 <a:latin typeface="Arial"/>
               </a:rPr>
               <a:t>Fifth Outline Level</a:t>
             </a:r>
-            <a:endParaRPr b="0" lang="en-US" sz="1800" spc="-1" strike="noStrike">
+            <a:endParaRPr b="0" lang="en-US" sz="2000" spc="-1" strike="noStrike">
               <a:latin typeface="Arial"/>
             </a:endParaRPr>
           </a:p>
@@ -2948,12 +2949,12 @@
               <a:buChar char=""/>
             </a:pPr>
             <a:r>
-              <a:rPr b="0" lang="en-US" sz="1800" spc="-1" strike="noStrike">
+              <a:rPr b="0" lang="en-US" sz="2000" spc="-1" strike="noStrike">
                 <a:latin typeface="Arial"/>
               </a:rPr>
               <a:t>Sixth Outline Level</a:t>
             </a:r>
-            <a:endParaRPr b="0" lang="en-US" sz="1800" spc="-1" strike="noStrike">
+            <a:endParaRPr b="0" lang="en-US" sz="2000" spc="-1" strike="noStrike">
               <a:latin typeface="Arial"/>
             </a:endParaRPr>
           </a:p>
@@ -2970,12 +2971,12 @@
               <a:buChar char=""/>
             </a:pPr>
             <a:r>
-              <a:rPr b="0" lang="en-US" sz="1800" spc="-1" strike="noStrike">
+              <a:rPr b="0" lang="en-US" sz="2000" spc="-1" strike="noStrike">
                 <a:latin typeface="Arial"/>
               </a:rPr>
               <a:t>Seventh Outline Level</a:t>
             </a:r>
-            <a:endParaRPr b="0" lang="en-US" sz="1800" spc="-1" strike="noStrike">
+            <a:endParaRPr b="0" lang="en-US" sz="2000" spc="-1" strike="noStrike">
               <a:latin typeface="Arial"/>
             </a:endParaRPr>
           </a:p>
@@ -3031,7 +3032,7 @@
         <p:spPr>
           <a:xfrm>
             <a:off x="-58320" y="81000"/>
-            <a:ext cx="7793640" cy="1204920"/>
+            <a:ext cx="7793280" cy="1204560"/>
           </a:xfrm>
           <a:prstGeom prst="rect">
             <a:avLst/>
@@ -3054,7 +3055,7 @@
         <p:spPr>
           <a:xfrm>
             <a:off x="504000" y="210600"/>
-            <a:ext cx="7019280" cy="946800"/>
+            <a:ext cx="7018920" cy="946800"/>
           </a:xfrm>
           <a:prstGeom prst="rect">
             <a:avLst/>
@@ -3090,15 +3091,15 @@
         <p:spPr>
           <a:xfrm>
             <a:off x="504000" y="1326600"/>
-            <a:ext cx="4426560" cy="3288240"/>
-          </a:xfrm>
-          <a:prstGeom prst="rect">
-            <a:avLst/>
-          </a:prstGeom>
-        </p:spPr>
-        <p:txBody>
-          <a:bodyPr lIns="0" rIns="0" tIns="0" bIns="0">
-            <a:normAutofit/>
+            <a:ext cx="2159640" cy="3287880"/>
+          </a:xfrm>
+          <a:prstGeom prst="rect">
+            <a:avLst/>
+          </a:prstGeom>
+        </p:spPr>
+        <p:txBody>
+          <a:bodyPr lIns="0" rIns="0" tIns="0" bIns="0">
+            <a:normAutofit fontScale="6000"/>
           </a:bodyPr>
           <a:p>
             <a:pPr marL="432000" indent="-324000">
@@ -3268,16 +3269,16 @@
         </p:nvSpPr>
         <p:spPr>
           <a:xfrm>
-            <a:off x="5152680" y="1326600"/>
-            <a:ext cx="4426560" cy="3288240"/>
-          </a:xfrm>
-          <a:prstGeom prst="rect">
-            <a:avLst/>
-          </a:prstGeom>
-        </p:spPr>
-        <p:txBody>
-          <a:bodyPr lIns="0" rIns="0" tIns="0" bIns="0">
-            <a:normAutofit/>
+            <a:off x="2772360" y="1326600"/>
+            <a:ext cx="2159640" cy="3287880"/>
+          </a:xfrm>
+          <a:prstGeom prst="rect">
+            <a:avLst/>
+          </a:prstGeom>
+        </p:spPr>
+        <p:txBody>
+          <a:bodyPr lIns="0" rIns="0" tIns="0" bIns="0">
+            <a:normAutofit fontScale="6000"/>
           </a:bodyPr>
           <a:p>
             <a:pPr marL="432000" indent="-324000">
@@ -3481,7 +3482,7 @@
         <p:spPr>
           <a:xfrm>
             <a:off x="504000" y="411480"/>
-            <a:ext cx="7019280" cy="543960"/>
+            <a:ext cx="7018920" cy="543600"/>
           </a:xfrm>
           <a:prstGeom prst="rect">
             <a:avLst/>
@@ -3532,7 +3533,7 @@
         <p:spPr>
           <a:xfrm>
             <a:off x="504000" y="2401560"/>
-            <a:ext cx="9071280" cy="1220040"/>
+            <a:ext cx="9070920" cy="1219680"/>
           </a:xfrm>
           <a:prstGeom prst="rect">
             <a:avLst/>
@@ -3683,7 +3684,7 @@
         <p:spPr>
           <a:xfrm>
             <a:off x="504000" y="348120"/>
-            <a:ext cx="7019280" cy="671040"/>
+            <a:ext cx="7018920" cy="670680"/>
           </a:xfrm>
           <a:prstGeom prst="rect">
             <a:avLst/>
@@ -3711,7 +3712,11 @@
             </a:pPr>
             <a:r>
               <a:rPr b="0" lang="en-US" sz="4400" spc="-1" strike="noStrike">
+                <a:solidFill>
+                  <a:srgbClr val="000000"/>
+                </a:solidFill>
                 <a:latin typeface="Arial"/>
+                <a:ea typeface="DejaVu Sans"/>
               </a:rPr>
               <a:t>Overview</a:t>
             </a:r>
@@ -3730,7 +3735,7 @@
         <p:spPr>
           <a:xfrm>
             <a:off x="504000" y="1326600"/>
-            <a:ext cx="4426560" cy="3288240"/>
+            <a:ext cx="4426200" cy="3287880"/>
           </a:xfrm>
           <a:prstGeom prst="rect">
             <a:avLst/>
@@ -3751,7 +3756,7 @@
             <a:normAutofit/>
           </a:bodyPr>
           <a:p>
-            <a:pPr marL="432000" indent="-323640">
+            <a:pPr marL="432000" indent="-323280">
               <a:lnSpc>
                 <a:spcPct val="100000"/>
               </a:lnSpc>
@@ -3767,7 +3772,11 @@
             </a:pPr>
             <a:r>
               <a:rPr b="0" lang="en-US" sz="3200" spc="-1" strike="noStrike">
+                <a:solidFill>
+                  <a:srgbClr val="000000"/>
+                </a:solidFill>
                 <a:latin typeface="Arial"/>
+                <a:ea typeface="DejaVu Sans"/>
               </a:rPr>
               <a:t>This week:</a:t>
             </a:r>
@@ -3786,7 +3795,11 @@
             </a:pPr>
             <a:r>
               <a:rPr b="0" lang="en-US" sz="2800" spc="-1" strike="noStrike">
+                <a:solidFill>
+                  <a:srgbClr val="000000"/>
+                </a:solidFill>
                 <a:latin typeface="Arial"/>
+                <a:ea typeface="DejaVu Sans"/>
               </a:rPr>
               <a:t>06_cuda_cnn_hooks</a:t>
             </a:r>
@@ -3805,7 +3818,11 @@
             </a:pPr>
             <a:r>
               <a:rPr b="0" lang="en-US" sz="2800" spc="-1" strike="noStrike">
+                <a:solidFill>
+                  <a:srgbClr val="000000"/>
+                </a:solidFill>
                 <a:latin typeface="Arial"/>
+                <a:ea typeface="DejaVu Sans"/>
               </a:rPr>
               <a:t>07_batchnorm</a:t>
             </a:r>
@@ -3824,7 +3841,7 @@
         <p:spPr>
           <a:xfrm>
             <a:off x="5152680" y="1326600"/>
-            <a:ext cx="4426560" cy="3288240"/>
+            <a:ext cx="4426200" cy="3287880"/>
           </a:xfrm>
           <a:prstGeom prst="rect">
             <a:avLst/>
@@ -3845,7 +3862,7 @@
             <a:normAutofit/>
           </a:bodyPr>
           <a:p>
-            <a:pPr marL="432000" indent="-323640">
+            <a:pPr marL="432000" indent="-323280">
               <a:lnSpc>
                 <a:spcPct val="100000"/>
               </a:lnSpc>
@@ -3861,7 +3878,11 @@
             </a:pPr>
             <a:r>
               <a:rPr b="0" lang="en-US" sz="3200" spc="-1" strike="noStrike">
+                <a:solidFill>
+                  <a:srgbClr val="000000"/>
+                </a:solidFill>
                 <a:latin typeface="Arial"/>
+                <a:ea typeface="DejaVu Sans"/>
               </a:rPr>
               <a:t>Next week:</a:t>
             </a:r>
@@ -3880,7 +3901,11 @@
             </a:pPr>
             <a:r>
               <a:rPr b="0" lang="en-US" sz="2800" spc="-1" strike="noStrike">
+                <a:solidFill>
+                  <a:srgbClr val="000000"/>
+                </a:solidFill>
                 <a:latin typeface="Arial"/>
+                <a:ea typeface="DejaVu Sans"/>
               </a:rPr>
               <a:t>07a_lsuv</a:t>
             </a:r>
@@ -3899,7 +3924,11 @@
             </a:pPr>
             <a:r>
               <a:rPr b="0" lang="en-US" sz="2800" spc="-1" strike="noStrike">
+                <a:solidFill>
+                  <a:srgbClr val="000000"/>
+                </a:solidFill>
                 <a:latin typeface="Arial"/>
+                <a:ea typeface="DejaVu Sans"/>
               </a:rPr>
               <a:t>08_data_block</a:t>
             </a:r>
@@ -3918,7 +3947,11 @@
             </a:pPr>
             <a:r>
               <a:rPr b="0" lang="en-US" sz="2800" spc="-1" strike="noStrike">
+                <a:solidFill>
+                  <a:srgbClr val="000000"/>
+                </a:solidFill>
                 <a:latin typeface="Arial"/>
+                <a:ea typeface="DejaVu Sans"/>
               </a:rPr>
               <a:t>09_optimizers</a:t>
             </a:r>

</xml_diff>